<commit_message>
add camera-based PPG app
</commit_message>
<xml_diff>
--- a/weekly report.pptx
+++ b/weekly report.pptx
@@ -8,6 +8,9 @@
     <p:sldId id="257" r:id="rId2"/>
     <p:sldId id="259" r:id="rId3"/>
     <p:sldId id="258" r:id="rId4"/>
+    <p:sldId id="260" r:id="rId5"/>
+    <p:sldId id="261" r:id="rId6"/>
+    <p:sldId id="262" r:id="rId7"/>
   </p:sldIdLst>
   <p:sldSz cx="12192000" cy="6858000"/>
   <p:notesSz cx="6858000" cy="9144000"/>
@@ -261,7 +264,7 @@
           <a:p>
             <a:fld id="{B2701F67-69F6-4BB3-966A-260D0646A8B7}" type="datetimeFigureOut">
               <a:rPr lang="en-US" smtClean="0"/>
-              <a:t>10/23/2023</a:t>
+              <a:t>10/25/2023</a:t>
             </a:fld>
             <a:endParaRPr lang="en-US"/>
           </a:p>
@@ -459,7 +462,7 @@
           <a:p>
             <a:fld id="{B2701F67-69F6-4BB3-966A-260D0646A8B7}" type="datetimeFigureOut">
               <a:rPr lang="en-US" smtClean="0"/>
-              <a:t>10/23/2023</a:t>
+              <a:t>10/25/2023</a:t>
             </a:fld>
             <a:endParaRPr lang="en-US"/>
           </a:p>
@@ -667,7 +670,7 @@
           <a:p>
             <a:fld id="{B2701F67-69F6-4BB3-966A-260D0646A8B7}" type="datetimeFigureOut">
               <a:rPr lang="en-US" smtClean="0"/>
-              <a:t>10/23/2023</a:t>
+              <a:t>10/25/2023</a:t>
             </a:fld>
             <a:endParaRPr lang="en-US"/>
           </a:p>
@@ -865,7 +868,7 @@
           <a:p>
             <a:fld id="{B2701F67-69F6-4BB3-966A-260D0646A8B7}" type="datetimeFigureOut">
               <a:rPr lang="en-US" smtClean="0"/>
-              <a:t>10/23/2023</a:t>
+              <a:t>10/25/2023</a:t>
             </a:fld>
             <a:endParaRPr lang="en-US"/>
           </a:p>
@@ -1140,7 +1143,7 @@
           <a:p>
             <a:fld id="{B2701F67-69F6-4BB3-966A-260D0646A8B7}" type="datetimeFigureOut">
               <a:rPr lang="en-US" smtClean="0"/>
-              <a:t>10/23/2023</a:t>
+              <a:t>10/25/2023</a:t>
             </a:fld>
             <a:endParaRPr lang="en-US"/>
           </a:p>
@@ -1405,7 +1408,7 @@
           <a:p>
             <a:fld id="{B2701F67-69F6-4BB3-966A-260D0646A8B7}" type="datetimeFigureOut">
               <a:rPr lang="en-US" smtClean="0"/>
-              <a:t>10/23/2023</a:t>
+              <a:t>10/25/2023</a:t>
             </a:fld>
             <a:endParaRPr lang="en-US"/>
           </a:p>
@@ -1817,7 +1820,7 @@
           <a:p>
             <a:fld id="{B2701F67-69F6-4BB3-966A-260D0646A8B7}" type="datetimeFigureOut">
               <a:rPr lang="en-US" smtClean="0"/>
-              <a:t>10/23/2023</a:t>
+              <a:t>10/25/2023</a:t>
             </a:fld>
             <a:endParaRPr lang="en-US"/>
           </a:p>
@@ -1958,7 +1961,7 @@
           <a:p>
             <a:fld id="{B2701F67-69F6-4BB3-966A-260D0646A8B7}" type="datetimeFigureOut">
               <a:rPr lang="en-US" smtClean="0"/>
-              <a:t>10/23/2023</a:t>
+              <a:t>10/25/2023</a:t>
             </a:fld>
             <a:endParaRPr lang="en-US"/>
           </a:p>
@@ -2071,7 +2074,7 @@
           <a:p>
             <a:fld id="{B2701F67-69F6-4BB3-966A-260D0646A8B7}" type="datetimeFigureOut">
               <a:rPr lang="en-US" smtClean="0"/>
-              <a:t>10/23/2023</a:t>
+              <a:t>10/25/2023</a:t>
             </a:fld>
             <a:endParaRPr lang="en-US"/>
           </a:p>
@@ -2382,7 +2385,7 @@
           <a:p>
             <a:fld id="{B2701F67-69F6-4BB3-966A-260D0646A8B7}" type="datetimeFigureOut">
               <a:rPr lang="en-US" smtClean="0"/>
-              <a:t>10/23/2023</a:t>
+              <a:t>10/25/2023</a:t>
             </a:fld>
             <a:endParaRPr lang="en-US"/>
           </a:p>
@@ -2670,7 +2673,7 @@
           <a:p>
             <a:fld id="{B2701F67-69F6-4BB3-966A-260D0646A8B7}" type="datetimeFigureOut">
               <a:rPr lang="en-US" smtClean="0"/>
-              <a:t>10/23/2023</a:t>
+              <a:t>10/25/2023</a:t>
             </a:fld>
             <a:endParaRPr lang="en-US"/>
           </a:p>
@@ -2911,7 +2914,7 @@
           <a:p>
             <a:fld id="{B2701F67-69F6-4BB3-966A-260D0646A8B7}" type="datetimeFigureOut">
               <a:rPr lang="en-US" smtClean="0"/>
-              <a:t>10/23/2023</a:t>
+              <a:t>10/25/2023</a:t>
             </a:fld>
             <a:endParaRPr lang="en-US"/>
           </a:p>
@@ -3697,6 +3700,977 @@
     <p:extLst>
       <p:ext uri="{BB962C8B-B14F-4D97-AF65-F5344CB8AC3E}">
         <p14:creationId xmlns:p14="http://schemas.microsoft.com/office/powerpoint/2010/main" val="4067212226"/>
+      </p:ext>
+    </p:extLst>
+  </p:cSld>
+  <p:clrMapOvr>
+    <a:masterClrMapping/>
+  </p:clrMapOvr>
+</p:sld>
+</file>
+
+<file path=ppt/slides/slide4.xml><?xml version="1.0" encoding="utf-8"?>
+<p:sld xmlns:a="http://schemas.openxmlformats.org/drawingml/2006/main" xmlns:r="http://schemas.openxmlformats.org/officeDocument/2006/relationships" xmlns:p="http://schemas.openxmlformats.org/presentationml/2006/main">
+  <p:cSld>
+    <p:spTree>
+      <p:nvGrpSpPr>
+        <p:cNvPr id="1" name=""/>
+        <p:cNvGrpSpPr/>
+        <p:nvPr/>
+      </p:nvGrpSpPr>
+      <p:grpSpPr>
+        <a:xfrm>
+          <a:off x="0" y="0"/>
+          <a:ext cx="0" cy="0"/>
+          <a:chOff x="0" y="0"/>
+          <a:chExt cx="0" cy="0"/>
+        </a:xfrm>
+      </p:grpSpPr>
+      <p:sp>
+        <p:nvSpPr>
+          <p:cNvPr id="2" name="Title 1">
+            <a:extLst>
+              <a:ext uri="{FF2B5EF4-FFF2-40B4-BE49-F238E27FC236}">
+                <a16:creationId xmlns:a16="http://schemas.microsoft.com/office/drawing/2014/main" id="{E5D79D59-E40D-941B-AFF9-305AF8FA5439}"/>
+              </a:ext>
+            </a:extLst>
+          </p:cNvPr>
+          <p:cNvSpPr>
+            <a:spLocks noGrp="1"/>
+          </p:cNvSpPr>
+          <p:nvPr>
+            <p:ph type="title"/>
+          </p:nvPr>
+        </p:nvSpPr>
+        <p:spPr/>
+        <p:txBody>
+          <a:bodyPr/>
+          <a:lstStyle/>
+          <a:p>
+            <a:r>
+              <a:rPr lang="en-US" dirty="0"/>
+              <a:t>C</a:t>
+            </a:r>
+            <a:r>
+              <a:rPr lang="en-US" altLang="zh-CN" dirty="0"/>
+              <a:t>omparison</a:t>
+            </a:r>
+            <a:endParaRPr lang="en-US" dirty="0"/>
+          </a:p>
+        </p:txBody>
+      </p:sp>
+      <p:pic>
+        <p:nvPicPr>
+          <p:cNvPr id="1026" name="Picture 2" descr="Amazon.com: 1007079-1 - Contact Microphone, CM-01B, PVDF Piezo Film, 40  V/mm, 8 to 2200 Hz, 5 Vdc : 工業與科學">
+            <a:extLst>
+              <a:ext uri="{FF2B5EF4-FFF2-40B4-BE49-F238E27FC236}">
+                <a16:creationId xmlns:a16="http://schemas.microsoft.com/office/drawing/2014/main" id="{2DADCC80-AB76-E659-985D-84F4238475CE}"/>
+              </a:ext>
+            </a:extLst>
+          </p:cNvPr>
+          <p:cNvPicPr>
+            <a:picLocks noChangeAspect="1" noChangeArrowheads="1"/>
+          </p:cNvPicPr>
+          <p:nvPr/>
+        </p:nvPicPr>
+        <p:blipFill>
+          <a:blip r:embed="rId2">
+            <a:extLst>
+              <a:ext uri="{28A0092B-C50C-407E-A947-70E740481C1C}">
+                <a14:useLocalDpi xmlns:a14="http://schemas.microsoft.com/office/drawing/2010/main" val="0"/>
+              </a:ext>
+            </a:extLst>
+          </a:blip>
+          <a:srcRect/>
+          <a:stretch>
+            <a:fillRect/>
+          </a:stretch>
+        </p:blipFill>
+        <p:spPr bwMode="auto">
+          <a:xfrm>
+            <a:off x="2274214" y="1654365"/>
+            <a:ext cx="1604971" cy="1325563"/>
+          </a:xfrm>
+          <a:prstGeom prst="rect">
+            <a:avLst/>
+          </a:prstGeom>
+          <a:noFill/>
+          <a:extLst>
+            <a:ext uri="{909E8E84-426E-40DD-AFC4-6F175D3DCCD1}">
+              <a14:hiddenFill xmlns:a14="http://schemas.microsoft.com/office/drawing/2010/main">
+                <a:solidFill>
+                  <a:srgbClr val="FFFFFF"/>
+                </a:solidFill>
+              </a14:hiddenFill>
+            </a:ext>
+          </a:extLst>
+        </p:spPr>
+      </p:pic>
+      <p:pic>
+        <p:nvPicPr>
+          <p:cNvPr id="1028" name="Picture 4" descr="SS30L - 製品 ：BIOPAC Systems">
+            <a:extLst>
+              <a:ext uri="{FF2B5EF4-FFF2-40B4-BE49-F238E27FC236}">
+                <a16:creationId xmlns:a16="http://schemas.microsoft.com/office/drawing/2014/main" id="{5AA27D7A-F6B4-14C1-BB1A-D63A32F217F3}"/>
+              </a:ext>
+            </a:extLst>
+          </p:cNvPr>
+          <p:cNvPicPr>
+            <a:picLocks noChangeAspect="1" noChangeArrowheads="1"/>
+          </p:cNvPicPr>
+          <p:nvPr/>
+        </p:nvPicPr>
+        <p:blipFill>
+          <a:blip r:embed="rId3">
+            <a:extLst>
+              <a:ext uri="{28A0092B-C50C-407E-A947-70E740481C1C}">
+                <a14:useLocalDpi xmlns:a14="http://schemas.microsoft.com/office/drawing/2010/main" val="0"/>
+              </a:ext>
+            </a:extLst>
+          </a:blip>
+          <a:srcRect/>
+          <a:stretch>
+            <a:fillRect/>
+          </a:stretch>
+        </p:blipFill>
+        <p:spPr bwMode="auto">
+          <a:xfrm>
+            <a:off x="4187587" y="1410308"/>
+            <a:ext cx="1604972" cy="1569620"/>
+          </a:xfrm>
+          <a:prstGeom prst="rect">
+            <a:avLst/>
+          </a:prstGeom>
+          <a:noFill/>
+          <a:extLst>
+            <a:ext uri="{909E8E84-426E-40DD-AFC4-6F175D3DCCD1}">
+              <a14:hiddenFill xmlns:a14="http://schemas.microsoft.com/office/drawing/2010/main">
+                <a:solidFill>
+                  <a:srgbClr val="FFFFFF"/>
+                </a:solidFill>
+              </a14:hiddenFill>
+            </a:ext>
+          </a:extLst>
+        </p:spPr>
+      </p:pic>
+      <p:sp>
+        <p:nvSpPr>
+          <p:cNvPr id="8" name="TextBox 7">
+            <a:extLst>
+              <a:ext uri="{FF2B5EF4-FFF2-40B4-BE49-F238E27FC236}">
+                <a16:creationId xmlns:a16="http://schemas.microsoft.com/office/drawing/2014/main" id="{DC337224-313E-0EC0-3616-183752E47C37}"/>
+              </a:ext>
+            </a:extLst>
+          </p:cNvPr>
+          <p:cNvSpPr txBox="1"/>
+          <p:nvPr/>
+        </p:nvSpPr>
+        <p:spPr>
+          <a:xfrm>
+            <a:off x="7201928" y="1690688"/>
+            <a:ext cx="4253429" cy="1107996"/>
+          </a:xfrm>
+          <a:prstGeom prst="rect">
+            <a:avLst/>
+          </a:prstGeom>
+          <a:noFill/>
+        </p:spPr>
+        <p:txBody>
+          <a:bodyPr wrap="square" rtlCol="0">
+            <a:spAutoFit/>
+          </a:bodyPr>
+          <a:lstStyle/>
+          <a:p>
+            <a:r>
+              <a:rPr lang="en-US" sz="2200" dirty="0"/>
+              <a:t>Stethoscope is better in term of </a:t>
+            </a:r>
+          </a:p>
+          <a:p>
+            <a:pPr marL="342900" indent="-342900">
+              <a:buAutoNum type="arabicPeriod"/>
+            </a:pPr>
+            <a:r>
+              <a:rPr lang="en-US" sz="2200" dirty="0"/>
+              <a:t>SNR</a:t>
+            </a:r>
+          </a:p>
+          <a:p>
+            <a:pPr marL="342900" indent="-342900">
+              <a:buAutoNum type="arabicPeriod"/>
+            </a:pPr>
+            <a:r>
+              <a:rPr lang="en-US" sz="2200" dirty="0"/>
+              <a:t>Robust to vibration</a:t>
+            </a:r>
+          </a:p>
+        </p:txBody>
+      </p:sp>
+      <p:sp>
+        <p:nvSpPr>
+          <p:cNvPr id="9" name="TextBox 8">
+            <a:extLst>
+              <a:ext uri="{FF2B5EF4-FFF2-40B4-BE49-F238E27FC236}">
+                <a16:creationId xmlns:a16="http://schemas.microsoft.com/office/drawing/2014/main" id="{0E907576-2BE2-6496-B538-BA72EDF95C53}"/>
+              </a:ext>
+            </a:extLst>
+          </p:cNvPr>
+          <p:cNvSpPr txBox="1"/>
+          <p:nvPr/>
+        </p:nvSpPr>
+        <p:spPr>
+          <a:xfrm>
+            <a:off x="2188029" y="3087870"/>
+            <a:ext cx="1691156" cy="369332"/>
+          </a:xfrm>
+          <a:prstGeom prst="rect">
+            <a:avLst/>
+          </a:prstGeom>
+          <a:noFill/>
+        </p:spPr>
+        <p:txBody>
+          <a:bodyPr wrap="square" rtlCol="0">
+            <a:spAutoFit/>
+          </a:bodyPr>
+          <a:lstStyle/>
+          <a:p>
+            <a:pPr algn="ctr"/>
+            <a:r>
+              <a:rPr lang="en-US" dirty="0"/>
+              <a:t>Contact Mic</a:t>
+            </a:r>
+          </a:p>
+        </p:txBody>
+      </p:sp>
+      <p:sp>
+        <p:nvSpPr>
+          <p:cNvPr id="10" name="TextBox 9">
+            <a:extLst>
+              <a:ext uri="{FF2B5EF4-FFF2-40B4-BE49-F238E27FC236}">
+                <a16:creationId xmlns:a16="http://schemas.microsoft.com/office/drawing/2014/main" id="{D0D08341-ED7C-42B2-C6DF-763DB810DE0B}"/>
+              </a:ext>
+            </a:extLst>
+          </p:cNvPr>
+          <p:cNvSpPr txBox="1"/>
+          <p:nvPr/>
+        </p:nvSpPr>
+        <p:spPr>
+          <a:xfrm>
+            <a:off x="4232902" y="3087870"/>
+            <a:ext cx="1691156" cy="369332"/>
+          </a:xfrm>
+          <a:prstGeom prst="rect">
+            <a:avLst/>
+          </a:prstGeom>
+          <a:noFill/>
+        </p:spPr>
+        <p:txBody>
+          <a:bodyPr wrap="square" rtlCol="0">
+            <a:spAutoFit/>
+          </a:bodyPr>
+          <a:lstStyle/>
+          <a:p>
+            <a:pPr algn="ctr"/>
+            <a:r>
+              <a:rPr lang="en-US" dirty="0"/>
+              <a:t>Stethoscope</a:t>
+            </a:r>
+          </a:p>
+        </p:txBody>
+      </p:sp>
+    </p:spTree>
+    <p:extLst>
+      <p:ext uri="{BB962C8B-B14F-4D97-AF65-F5344CB8AC3E}">
+        <p14:creationId xmlns:p14="http://schemas.microsoft.com/office/powerpoint/2010/main" val="1926107758"/>
+      </p:ext>
+    </p:extLst>
+  </p:cSld>
+  <p:clrMapOvr>
+    <a:masterClrMapping/>
+  </p:clrMapOvr>
+</p:sld>
+</file>
+
+<file path=ppt/slides/slide5.xml><?xml version="1.0" encoding="utf-8"?>
+<p:sld xmlns:a="http://schemas.openxmlformats.org/drawingml/2006/main" xmlns:r="http://schemas.openxmlformats.org/officeDocument/2006/relationships" xmlns:p="http://schemas.openxmlformats.org/presentationml/2006/main">
+  <p:cSld>
+    <p:spTree>
+      <p:nvGrpSpPr>
+        <p:cNvPr id="1" name=""/>
+        <p:cNvGrpSpPr/>
+        <p:nvPr/>
+      </p:nvGrpSpPr>
+      <p:grpSpPr>
+        <a:xfrm>
+          <a:off x="0" y="0"/>
+          <a:ext cx="0" cy="0"/>
+          <a:chOff x="0" y="0"/>
+          <a:chExt cx="0" cy="0"/>
+        </a:xfrm>
+      </p:grpSpPr>
+      <p:sp>
+        <p:nvSpPr>
+          <p:cNvPr id="2" name="Title 1">
+            <a:extLst>
+              <a:ext uri="{FF2B5EF4-FFF2-40B4-BE49-F238E27FC236}">
+                <a16:creationId xmlns:a16="http://schemas.microsoft.com/office/drawing/2014/main" id="{85FD8A4E-C5AD-64BA-4464-B8330C210C17}"/>
+              </a:ext>
+            </a:extLst>
+          </p:cNvPr>
+          <p:cNvSpPr>
+            <a:spLocks noGrp="1"/>
+          </p:cNvSpPr>
+          <p:nvPr>
+            <p:ph type="title"/>
+          </p:nvPr>
+        </p:nvSpPr>
+        <p:spPr/>
+        <p:txBody>
+          <a:bodyPr/>
+          <a:lstStyle/>
+          <a:p>
+            <a:r>
+              <a:rPr lang="en-US" dirty="0"/>
+              <a:t>Animal </a:t>
+            </a:r>
+            <a:r>
+              <a:rPr lang="en-US" altLang="zh-CN" dirty="0"/>
+              <a:t>Vital signs</a:t>
+            </a:r>
+            <a:endParaRPr lang="en-US" dirty="0"/>
+          </a:p>
+        </p:txBody>
+      </p:sp>
+      <p:pic>
+        <p:nvPicPr>
+          <p:cNvPr id="1026" name="Picture 2">
+            <a:extLst>
+              <a:ext uri="{FF2B5EF4-FFF2-40B4-BE49-F238E27FC236}">
+                <a16:creationId xmlns:a16="http://schemas.microsoft.com/office/drawing/2014/main" id="{1B8F4271-051F-DD74-4548-01AA1817F024}"/>
+              </a:ext>
+            </a:extLst>
+          </p:cNvPr>
+          <p:cNvPicPr>
+            <a:picLocks noChangeAspect="1" noChangeArrowheads="1"/>
+          </p:cNvPicPr>
+          <p:nvPr/>
+        </p:nvPicPr>
+        <p:blipFill>
+          <a:blip r:embed="rId2">
+            <a:extLst>
+              <a:ext uri="{28A0092B-C50C-407E-A947-70E740481C1C}">
+                <a14:useLocalDpi xmlns:a14="http://schemas.microsoft.com/office/drawing/2010/main" val="0"/>
+              </a:ext>
+            </a:extLst>
+          </a:blip>
+          <a:srcRect/>
+          <a:stretch>
+            <a:fillRect/>
+          </a:stretch>
+        </p:blipFill>
+        <p:spPr bwMode="auto">
+          <a:xfrm>
+            <a:off x="3636974" y="1771245"/>
+            <a:ext cx="1144836" cy="1526447"/>
+          </a:xfrm>
+          <a:prstGeom prst="rect">
+            <a:avLst/>
+          </a:prstGeom>
+          <a:noFill/>
+          <a:extLst>
+            <a:ext uri="{909E8E84-426E-40DD-AFC4-6F175D3DCCD1}">
+              <a14:hiddenFill xmlns:a14="http://schemas.microsoft.com/office/drawing/2010/main">
+                <a:solidFill>
+                  <a:srgbClr val="FFFFFF"/>
+                </a:solidFill>
+              </a14:hiddenFill>
+            </a:ext>
+          </a:extLst>
+        </p:spPr>
+      </p:pic>
+      <p:pic>
+        <p:nvPicPr>
+          <p:cNvPr id="5" name="Picture 4" descr="A close-up of a device&#10;&#10;Description automatically generated">
+            <a:extLst>
+              <a:ext uri="{FF2B5EF4-FFF2-40B4-BE49-F238E27FC236}">
+                <a16:creationId xmlns:a16="http://schemas.microsoft.com/office/drawing/2014/main" id="{F1662729-C072-7FF1-A3AE-E2E99830AF49}"/>
+              </a:ext>
+            </a:extLst>
+          </p:cNvPr>
+          <p:cNvPicPr>
+            <a:picLocks noChangeAspect="1"/>
+          </p:cNvPicPr>
+          <p:nvPr/>
+        </p:nvPicPr>
+        <p:blipFill>
+          <a:blip r:embed="rId3">
+            <a:extLst>
+              <a:ext uri="{28A0092B-C50C-407E-A947-70E740481C1C}">
+                <a14:useLocalDpi xmlns:a14="http://schemas.microsoft.com/office/drawing/2010/main" val="0"/>
+              </a:ext>
+            </a:extLst>
+          </a:blip>
+          <a:stretch>
+            <a:fillRect/>
+          </a:stretch>
+        </p:blipFill>
+        <p:spPr>
+          <a:xfrm>
+            <a:off x="7755648" y="3234522"/>
+            <a:ext cx="2086456" cy="1376173"/>
+          </a:xfrm>
+          <a:prstGeom prst="rect">
+            <a:avLst/>
+          </a:prstGeom>
+        </p:spPr>
+      </p:pic>
+      <p:pic>
+        <p:nvPicPr>
+          <p:cNvPr id="7" name="Picture 6" descr="A person working on a machine&#10;&#10;Description automatically generated">
+            <a:extLst>
+              <a:ext uri="{FF2B5EF4-FFF2-40B4-BE49-F238E27FC236}">
+                <a16:creationId xmlns:a16="http://schemas.microsoft.com/office/drawing/2014/main" id="{566AC54B-9CBC-EF5D-411A-3F63E77CDB85}"/>
+              </a:ext>
+            </a:extLst>
+          </p:cNvPr>
+          <p:cNvPicPr>
+            <a:picLocks noChangeAspect="1"/>
+          </p:cNvPicPr>
+          <p:nvPr/>
+        </p:nvPicPr>
+        <p:blipFill rotWithShape="1">
+          <a:blip r:embed="rId4">
+            <a:extLst>
+              <a:ext uri="{28A0092B-C50C-407E-A947-70E740481C1C}">
+                <a14:useLocalDpi xmlns:a14="http://schemas.microsoft.com/office/drawing/2010/main" val="0"/>
+              </a:ext>
+            </a:extLst>
+          </a:blip>
+          <a:srcRect l="46217"/>
+          <a:stretch/>
+        </p:blipFill>
+        <p:spPr>
+          <a:xfrm>
+            <a:off x="1131233" y="1888953"/>
+            <a:ext cx="2149972" cy="1408739"/>
+          </a:xfrm>
+          <a:prstGeom prst="rect">
+            <a:avLst/>
+          </a:prstGeom>
+        </p:spPr>
+      </p:pic>
+      <p:sp>
+        <p:nvSpPr>
+          <p:cNvPr id="9" name="TextBox 8">
+            <a:extLst>
+              <a:ext uri="{FF2B5EF4-FFF2-40B4-BE49-F238E27FC236}">
+                <a16:creationId xmlns:a16="http://schemas.microsoft.com/office/drawing/2014/main" id="{F4527F4F-68D3-17BF-819A-0D7A699B16CC}"/>
+              </a:ext>
+            </a:extLst>
+          </p:cNvPr>
+          <p:cNvSpPr txBox="1"/>
+          <p:nvPr/>
+        </p:nvSpPr>
+        <p:spPr>
+          <a:xfrm>
+            <a:off x="2946648" y="1204838"/>
+            <a:ext cx="1426029" cy="461665"/>
+          </a:xfrm>
+          <a:prstGeom prst="rect">
+            <a:avLst/>
+          </a:prstGeom>
+          <a:noFill/>
+        </p:spPr>
+        <p:txBody>
+          <a:bodyPr wrap="square" rtlCol="0">
+            <a:spAutoFit/>
+          </a:bodyPr>
+          <a:lstStyle/>
+          <a:p>
+            <a:pPr algn="ctr"/>
+            <a:r>
+              <a:rPr lang="en-US" sz="2400" dirty="0"/>
+              <a:t>HR</a:t>
+            </a:r>
+          </a:p>
+        </p:txBody>
+      </p:sp>
+      <p:sp>
+        <p:nvSpPr>
+          <p:cNvPr id="10" name="TextBox 9">
+            <a:extLst>
+              <a:ext uri="{FF2B5EF4-FFF2-40B4-BE49-F238E27FC236}">
+                <a16:creationId xmlns:a16="http://schemas.microsoft.com/office/drawing/2014/main" id="{C15C57FC-F593-F740-0822-64BDEA994B20}"/>
+              </a:ext>
+            </a:extLst>
+          </p:cNvPr>
+          <p:cNvSpPr txBox="1"/>
+          <p:nvPr/>
+        </p:nvSpPr>
+        <p:spPr>
+          <a:xfrm>
+            <a:off x="7970320" y="1204838"/>
+            <a:ext cx="1639940" cy="461665"/>
+          </a:xfrm>
+          <a:prstGeom prst="rect">
+            <a:avLst/>
+          </a:prstGeom>
+          <a:noFill/>
+        </p:spPr>
+        <p:txBody>
+          <a:bodyPr wrap="square" rtlCol="0">
+            <a:spAutoFit/>
+          </a:bodyPr>
+          <a:lstStyle/>
+          <a:p>
+            <a:pPr algn="ctr"/>
+            <a:r>
+              <a:rPr lang="en-US" sz="2400" dirty="0"/>
+              <a:t>RR</a:t>
+            </a:r>
+          </a:p>
+        </p:txBody>
+      </p:sp>
+      <p:sp>
+        <p:nvSpPr>
+          <p:cNvPr id="11" name="TextBox 10">
+            <a:extLst>
+              <a:ext uri="{FF2B5EF4-FFF2-40B4-BE49-F238E27FC236}">
+                <a16:creationId xmlns:a16="http://schemas.microsoft.com/office/drawing/2014/main" id="{E0DEF37F-09D3-85FA-41A6-C49938684653}"/>
+              </a:ext>
+            </a:extLst>
+          </p:cNvPr>
+          <p:cNvSpPr txBox="1"/>
+          <p:nvPr/>
+        </p:nvSpPr>
+        <p:spPr>
+          <a:xfrm>
+            <a:off x="9815633" y="3753198"/>
+            <a:ext cx="1864181" cy="369332"/>
+          </a:xfrm>
+          <a:prstGeom prst="rect">
+            <a:avLst/>
+          </a:prstGeom>
+          <a:noFill/>
+        </p:spPr>
+        <p:txBody>
+          <a:bodyPr wrap="square" rtlCol="0">
+            <a:spAutoFit/>
+          </a:bodyPr>
+          <a:lstStyle/>
+          <a:p>
+            <a:r>
+              <a:rPr lang="en-US" dirty="0"/>
+              <a:t>Chest-band RR</a:t>
+            </a:r>
+          </a:p>
+        </p:txBody>
+      </p:sp>
+      <p:pic>
+        <p:nvPicPr>
+          <p:cNvPr id="1042" name="Picture 18" descr="Camera Icon Vector Art, Icons, and Graphics for Free Download">
+            <a:extLst>
+              <a:ext uri="{FF2B5EF4-FFF2-40B4-BE49-F238E27FC236}">
+                <a16:creationId xmlns:a16="http://schemas.microsoft.com/office/drawing/2014/main" id="{27B16753-9CE0-F208-C2E1-4AA206556462}"/>
+              </a:ext>
+            </a:extLst>
+          </p:cNvPr>
+          <p:cNvPicPr>
+            <a:picLocks noChangeAspect="1" noChangeArrowheads="1"/>
+          </p:cNvPicPr>
+          <p:nvPr/>
+        </p:nvPicPr>
+        <p:blipFill>
+          <a:blip r:embed="rId5">
+            <a:extLst>
+              <a:ext uri="{28A0092B-C50C-407E-A947-70E740481C1C}">
+                <a14:useLocalDpi xmlns:a14="http://schemas.microsoft.com/office/drawing/2010/main" val="0"/>
+              </a:ext>
+            </a:extLst>
+          </a:blip>
+          <a:srcRect/>
+          <a:stretch>
+            <a:fillRect/>
+          </a:stretch>
+        </p:blipFill>
+        <p:spPr bwMode="auto">
+          <a:xfrm>
+            <a:off x="8632049" y="1775722"/>
+            <a:ext cx="1458800" cy="1458800"/>
+          </a:xfrm>
+          <a:prstGeom prst="rect">
+            <a:avLst/>
+          </a:prstGeom>
+          <a:noFill/>
+          <a:extLst>
+            <a:ext uri="{909E8E84-426E-40DD-AFC4-6F175D3DCCD1}">
+              <a14:hiddenFill xmlns:a14="http://schemas.microsoft.com/office/drawing/2010/main">
+                <a:solidFill>
+                  <a:srgbClr val="FFFFFF"/>
+                </a:solidFill>
+              </a14:hiddenFill>
+            </a:ext>
+          </a:extLst>
+        </p:spPr>
+      </p:pic>
+      <p:pic>
+        <p:nvPicPr>
+          <p:cNvPr id="1044" name="Picture 20" descr="Web camera - Free web icons">
+            <a:extLst>
+              <a:ext uri="{FF2B5EF4-FFF2-40B4-BE49-F238E27FC236}">
+                <a16:creationId xmlns:a16="http://schemas.microsoft.com/office/drawing/2014/main" id="{358E91FA-6B77-78D1-FBC4-85BDE3159556}"/>
+              </a:ext>
+            </a:extLst>
+          </p:cNvPr>
+          <p:cNvPicPr>
+            <a:picLocks noChangeAspect="1" noChangeArrowheads="1"/>
+          </p:cNvPicPr>
+          <p:nvPr/>
+        </p:nvPicPr>
+        <p:blipFill>
+          <a:blip r:embed="rId6">
+            <a:extLst>
+              <a:ext uri="{28A0092B-C50C-407E-A947-70E740481C1C}">
+                <a14:useLocalDpi xmlns:a14="http://schemas.microsoft.com/office/drawing/2010/main" val="0"/>
+              </a:ext>
+            </a:extLst>
+          </a:blip>
+          <a:srcRect/>
+          <a:stretch>
+            <a:fillRect/>
+          </a:stretch>
+        </p:blipFill>
+        <p:spPr bwMode="auto">
+          <a:xfrm>
+            <a:off x="7625228" y="2033619"/>
+            <a:ext cx="1006821" cy="1006821"/>
+          </a:xfrm>
+          <a:prstGeom prst="rect">
+            <a:avLst/>
+          </a:prstGeom>
+          <a:noFill/>
+          <a:extLst>
+            <a:ext uri="{909E8E84-426E-40DD-AFC4-6F175D3DCCD1}">
+              <a14:hiddenFill xmlns:a14="http://schemas.microsoft.com/office/drawing/2010/main">
+                <a:solidFill>
+                  <a:srgbClr val="FFFFFF"/>
+                </a:solidFill>
+              </a14:hiddenFill>
+            </a:ext>
+          </a:extLst>
+        </p:spPr>
+      </p:pic>
+      <p:sp>
+        <p:nvSpPr>
+          <p:cNvPr id="16" name="TextBox 15">
+            <a:extLst>
+              <a:ext uri="{FF2B5EF4-FFF2-40B4-BE49-F238E27FC236}">
+                <a16:creationId xmlns:a16="http://schemas.microsoft.com/office/drawing/2014/main" id="{978BCA29-719E-61A8-E5AE-924470015812}"/>
+              </a:ext>
+            </a:extLst>
+          </p:cNvPr>
+          <p:cNvSpPr txBox="1"/>
+          <p:nvPr/>
+        </p:nvSpPr>
+        <p:spPr>
+          <a:xfrm>
+            <a:off x="9815633" y="2352363"/>
+            <a:ext cx="1864181" cy="369332"/>
+          </a:xfrm>
+          <a:prstGeom prst="rect">
+            <a:avLst/>
+          </a:prstGeom>
+          <a:noFill/>
+        </p:spPr>
+        <p:txBody>
+          <a:bodyPr wrap="square" rtlCol="0">
+            <a:spAutoFit/>
+          </a:bodyPr>
+          <a:lstStyle/>
+          <a:p>
+            <a:r>
+              <a:rPr lang="en-US" dirty="0"/>
+              <a:t>Vision RR</a:t>
+            </a:r>
+          </a:p>
+        </p:txBody>
+      </p:sp>
+      <p:sp>
+        <p:nvSpPr>
+          <p:cNvPr id="6" name="TextBox 5">
+            <a:extLst>
+              <a:ext uri="{FF2B5EF4-FFF2-40B4-BE49-F238E27FC236}">
+                <a16:creationId xmlns:a16="http://schemas.microsoft.com/office/drawing/2014/main" id="{8353CE18-2725-DC14-ADD6-EEC674A87332}"/>
+              </a:ext>
+            </a:extLst>
+          </p:cNvPr>
+          <p:cNvSpPr txBox="1"/>
+          <p:nvPr/>
+        </p:nvSpPr>
+        <p:spPr>
+          <a:xfrm>
+            <a:off x="4481425" y="2369150"/>
+            <a:ext cx="1699518" cy="369332"/>
+          </a:xfrm>
+          <a:prstGeom prst="rect">
+            <a:avLst/>
+          </a:prstGeom>
+          <a:noFill/>
+        </p:spPr>
+        <p:txBody>
+          <a:bodyPr wrap="square" rtlCol="0">
+            <a:spAutoFit/>
+          </a:bodyPr>
+          <a:lstStyle/>
+          <a:p>
+            <a:r>
+              <a:rPr lang="en-US" dirty="0"/>
+              <a:t>P</a:t>
+            </a:r>
+            <a:r>
+              <a:rPr lang="en-US" altLang="zh-CN" dirty="0"/>
+              <a:t>ulse </a:t>
+            </a:r>
+            <a:r>
+              <a:rPr lang="en-US" dirty="0"/>
+              <a:t>oximeter</a:t>
+            </a:r>
+          </a:p>
+        </p:txBody>
+      </p:sp>
+      <p:pic>
+        <p:nvPicPr>
+          <p:cNvPr id="17" name="Picture 16" descr="A device with a cable attached to it&#10;&#10;Description automatically generated">
+            <a:extLst>
+              <a:ext uri="{FF2B5EF4-FFF2-40B4-BE49-F238E27FC236}">
+                <a16:creationId xmlns:a16="http://schemas.microsoft.com/office/drawing/2014/main" id="{1D52AB8D-4DF0-6C15-A4A8-F07AAE20676D}"/>
+              </a:ext>
+            </a:extLst>
+          </p:cNvPr>
+          <p:cNvPicPr>
+            <a:picLocks noChangeAspect="1"/>
+          </p:cNvPicPr>
+          <p:nvPr/>
+        </p:nvPicPr>
+        <p:blipFill>
+          <a:blip r:embed="rId7">
+            <a:extLst>
+              <a:ext uri="{28A0092B-C50C-407E-A947-70E740481C1C}">
+                <a14:useLocalDpi xmlns:a14="http://schemas.microsoft.com/office/drawing/2010/main" val="0"/>
+              </a:ext>
+            </a:extLst>
+          </a:blip>
+          <a:stretch>
+            <a:fillRect/>
+          </a:stretch>
+        </p:blipFill>
+        <p:spPr>
+          <a:xfrm>
+            <a:off x="2206219" y="3423059"/>
+            <a:ext cx="1699519" cy="1399343"/>
+          </a:xfrm>
+          <a:prstGeom prst="rect">
+            <a:avLst/>
+          </a:prstGeom>
+        </p:spPr>
+      </p:pic>
+      <p:sp>
+        <p:nvSpPr>
+          <p:cNvPr id="19" name="TextBox 18">
+            <a:extLst>
+              <a:ext uri="{FF2B5EF4-FFF2-40B4-BE49-F238E27FC236}">
+                <a16:creationId xmlns:a16="http://schemas.microsoft.com/office/drawing/2014/main" id="{964B9388-E1A8-32A4-8596-89B78F10AE4A}"/>
+              </a:ext>
+            </a:extLst>
+          </p:cNvPr>
+          <p:cNvSpPr txBox="1"/>
+          <p:nvPr/>
+        </p:nvSpPr>
+        <p:spPr>
+          <a:xfrm>
+            <a:off x="4484752" y="3922608"/>
+            <a:ext cx="1699518" cy="369332"/>
+          </a:xfrm>
+          <a:prstGeom prst="rect">
+            <a:avLst/>
+          </a:prstGeom>
+          <a:noFill/>
+        </p:spPr>
+        <p:txBody>
+          <a:bodyPr wrap="square" rtlCol="0">
+            <a:spAutoFit/>
+          </a:bodyPr>
+          <a:lstStyle/>
+          <a:p>
+            <a:r>
+              <a:rPr lang="en-US" dirty="0"/>
+              <a:t>PPG sensor</a:t>
+            </a:r>
+          </a:p>
+        </p:txBody>
+      </p:sp>
+      <p:pic>
+        <p:nvPicPr>
+          <p:cNvPr id="21" name="Picture 20" descr="A close-up of a device&#10;&#10;Description automatically generated">
+            <a:extLst>
+              <a:ext uri="{FF2B5EF4-FFF2-40B4-BE49-F238E27FC236}">
+                <a16:creationId xmlns:a16="http://schemas.microsoft.com/office/drawing/2014/main" id="{9EB4B5AE-4640-998C-1F2E-0A9F09D7C5D6}"/>
+              </a:ext>
+            </a:extLst>
+          </p:cNvPr>
+          <p:cNvPicPr>
+            <a:picLocks noChangeAspect="1"/>
+          </p:cNvPicPr>
+          <p:nvPr/>
+        </p:nvPicPr>
+        <p:blipFill>
+          <a:blip r:embed="rId8">
+            <a:extLst>
+              <a:ext uri="{28A0092B-C50C-407E-A947-70E740481C1C}">
+                <a14:useLocalDpi xmlns:a14="http://schemas.microsoft.com/office/drawing/2010/main" val="0"/>
+              </a:ext>
+            </a:extLst>
+          </a:blip>
+          <a:stretch>
+            <a:fillRect/>
+          </a:stretch>
+        </p:blipFill>
+        <p:spPr>
+          <a:xfrm>
+            <a:off x="1745624" y="4872916"/>
+            <a:ext cx="2319598" cy="1836122"/>
+          </a:xfrm>
+          <a:prstGeom prst="rect">
+            <a:avLst/>
+          </a:prstGeom>
+        </p:spPr>
+      </p:pic>
+      <p:sp>
+        <p:nvSpPr>
+          <p:cNvPr id="22" name="TextBox 21">
+            <a:extLst>
+              <a:ext uri="{FF2B5EF4-FFF2-40B4-BE49-F238E27FC236}">
+                <a16:creationId xmlns:a16="http://schemas.microsoft.com/office/drawing/2014/main" id="{975D3E69-9547-35A7-97F1-A98105AFE822}"/>
+              </a:ext>
+            </a:extLst>
+          </p:cNvPr>
+          <p:cNvSpPr txBox="1"/>
+          <p:nvPr/>
+        </p:nvSpPr>
+        <p:spPr>
+          <a:xfrm>
+            <a:off x="4481425" y="5641021"/>
+            <a:ext cx="2569144" cy="369332"/>
+          </a:xfrm>
+          <a:prstGeom prst="rect">
+            <a:avLst/>
+          </a:prstGeom>
+          <a:noFill/>
+        </p:spPr>
+        <p:txBody>
+          <a:bodyPr wrap="square" rtlCol="0">
+            <a:spAutoFit/>
+          </a:bodyPr>
+          <a:lstStyle/>
+          <a:p>
+            <a:r>
+              <a:rPr lang="en-US" dirty="0"/>
+              <a:t>ECG (golden standard)</a:t>
+            </a:r>
+          </a:p>
+        </p:txBody>
+      </p:sp>
+    </p:spTree>
+    <p:extLst>
+      <p:ext uri="{BB962C8B-B14F-4D97-AF65-F5344CB8AC3E}">
+        <p14:creationId xmlns:p14="http://schemas.microsoft.com/office/powerpoint/2010/main" val="1977721976"/>
+      </p:ext>
+    </p:extLst>
+  </p:cSld>
+  <p:clrMapOvr>
+    <a:masterClrMapping/>
+  </p:clrMapOvr>
+</p:sld>
+</file>
+
+<file path=ppt/slides/slide6.xml><?xml version="1.0" encoding="utf-8"?>
+<p:sld xmlns:a="http://schemas.openxmlformats.org/drawingml/2006/main" xmlns:r="http://schemas.openxmlformats.org/officeDocument/2006/relationships" xmlns:p="http://schemas.openxmlformats.org/presentationml/2006/main">
+  <p:cSld>
+    <p:spTree>
+      <p:nvGrpSpPr>
+        <p:cNvPr id="1" name=""/>
+        <p:cNvGrpSpPr/>
+        <p:nvPr/>
+      </p:nvGrpSpPr>
+      <p:grpSpPr>
+        <a:xfrm>
+          <a:off x="0" y="0"/>
+          <a:ext cx="0" cy="0"/>
+          <a:chOff x="0" y="0"/>
+          <a:chExt cx="0" cy="0"/>
+        </a:xfrm>
+      </p:grpSpPr>
+      <p:sp>
+        <p:nvSpPr>
+          <p:cNvPr id="2" name="Title 1">
+            <a:extLst>
+              <a:ext uri="{FF2B5EF4-FFF2-40B4-BE49-F238E27FC236}">
+                <a16:creationId xmlns:a16="http://schemas.microsoft.com/office/drawing/2014/main" id="{B82AF7AF-21F8-57B0-628E-8660392F9B54}"/>
+              </a:ext>
+            </a:extLst>
+          </p:cNvPr>
+          <p:cNvSpPr>
+            <a:spLocks noGrp="1"/>
+          </p:cNvSpPr>
+          <p:nvPr>
+            <p:ph type="title"/>
+          </p:nvPr>
+        </p:nvSpPr>
+        <p:spPr/>
+        <p:txBody>
+          <a:bodyPr/>
+          <a:lstStyle/>
+          <a:p>
+            <a:r>
+              <a:rPr lang="en-US" dirty="0"/>
+              <a:t>Stethoscope </a:t>
+            </a:r>
+            <a:r>
+              <a:rPr lang="en-US"/>
+              <a:t>on smartphone</a:t>
+            </a:r>
+          </a:p>
+        </p:txBody>
+      </p:sp>
+      <p:sp>
+        <p:nvSpPr>
+          <p:cNvPr id="3" name="Content Placeholder 2">
+            <a:extLst>
+              <a:ext uri="{FF2B5EF4-FFF2-40B4-BE49-F238E27FC236}">
+                <a16:creationId xmlns:a16="http://schemas.microsoft.com/office/drawing/2014/main" id="{A63ADB7C-E23D-9080-298C-741666E4EE95}"/>
+              </a:ext>
+            </a:extLst>
+          </p:cNvPr>
+          <p:cNvSpPr>
+            <a:spLocks noGrp="1"/>
+          </p:cNvSpPr>
+          <p:nvPr>
+            <p:ph idx="1"/>
+          </p:nvPr>
+        </p:nvSpPr>
+        <p:spPr/>
+        <p:txBody>
+          <a:bodyPr/>
+          <a:lstStyle/>
+          <a:p>
+            <a:endParaRPr lang="en-US"/>
+          </a:p>
+        </p:txBody>
+      </p:sp>
+    </p:spTree>
+    <p:extLst>
+      <p:ext uri="{BB962C8B-B14F-4D97-AF65-F5344CB8AC3E}">
+        <p14:creationId xmlns:p14="http://schemas.microsoft.com/office/powerpoint/2010/main" val="3476191028"/>
       </p:ext>
     </p:extLst>
   </p:cSld>

</xml_diff>